<commit_message>
changes to erd and videoLink added
</commit_message>
<xml_diff>
--- a/midReview.pptx
+++ b/midReview.pptx
@@ -1652,7 +1652,7 @@
         <p:spPr>
           <a:xfrm>
             <a:off x="504000" y="1828800"/>
-            <a:ext cx="9070560" cy="822240"/>
+            <a:ext cx="9068760" cy="820440"/>
           </a:xfrm>
           <a:prstGeom prst="rect">
             <a:avLst/>
@@ -1702,8 +1702,8 @@
         </p:nvSpPr>
         <p:spPr>
           <a:xfrm>
-            <a:off x="7863840" y="4389120"/>
-            <a:ext cx="2193840" cy="1231200"/>
+            <a:off x="7888320" y="4389120"/>
+            <a:ext cx="2192040" cy="1229400"/>
           </a:xfrm>
           <a:prstGeom prst="rect">
             <a:avLst/>
@@ -1724,7 +1724,7 @@
             <a:normAutofit/>
           </a:bodyPr>
           <a:p>
-            <a:pPr marL="432000" indent="-323280">
+            <a:pPr marL="432000" indent="-321480">
               <a:lnSpc>
                 <a:spcPct val="100000"/>
               </a:lnSpc>
@@ -1793,7 +1793,7 @@
         <p:spPr>
           <a:xfrm>
             <a:off x="504000" y="274320"/>
-            <a:ext cx="9070560" cy="822240"/>
+            <a:ext cx="9068760" cy="820440"/>
           </a:xfrm>
           <a:prstGeom prst="rect">
             <a:avLst/>
@@ -1844,7 +1844,7 @@
         <p:spPr>
           <a:xfrm>
             <a:off x="504000" y="1326600"/>
-            <a:ext cx="9071280" cy="3287880"/>
+            <a:ext cx="9069480" cy="3286080"/>
           </a:xfrm>
           <a:prstGeom prst="rect">
             <a:avLst/>
@@ -1873,8 +1873,8 @@
         </p:blipFill>
         <p:spPr>
           <a:xfrm>
-            <a:off x="46440" y="1219680"/>
-            <a:ext cx="10011240" cy="4357440"/>
+            <a:off x="0" y="1097280"/>
+            <a:ext cx="10080360" cy="4358160"/>
           </a:xfrm>
           <a:prstGeom prst="rect">
             <a:avLst/>
@@ -1923,7 +1923,7 @@
         <p:spPr>
           <a:xfrm>
             <a:off x="504000" y="274320"/>
-            <a:ext cx="9070560" cy="730800"/>
+            <a:ext cx="9068760" cy="729000"/>
           </a:xfrm>
           <a:prstGeom prst="rect">
             <a:avLst/>
@@ -1974,7 +1974,7 @@
         <p:spPr>
           <a:xfrm>
             <a:off x="504000" y="1326600"/>
-            <a:ext cx="9071280" cy="3287880"/>
+            <a:ext cx="9069480" cy="3286080"/>
           </a:xfrm>
           <a:prstGeom prst="rect">
             <a:avLst/>
@@ -2003,8 +2003,8 @@
         </p:blipFill>
         <p:spPr>
           <a:xfrm>
-            <a:off x="118440" y="1097280"/>
-            <a:ext cx="9848160" cy="3990240"/>
+            <a:off x="91440" y="1130040"/>
+            <a:ext cx="9847800" cy="3989880"/>
           </a:xfrm>
           <a:prstGeom prst="rect">
             <a:avLst/>
@@ -2053,7 +2053,7 @@
         <p:spPr>
           <a:xfrm>
             <a:off x="504000" y="274320"/>
-            <a:ext cx="9070560" cy="730800"/>
+            <a:ext cx="9068760" cy="729000"/>
           </a:xfrm>
           <a:prstGeom prst="rect">
             <a:avLst/>
@@ -2104,7 +2104,7 @@
         <p:spPr>
           <a:xfrm>
             <a:off x="504000" y="1326600"/>
-            <a:ext cx="9071280" cy="3287880"/>
+            <a:ext cx="9069480" cy="3286080"/>
           </a:xfrm>
           <a:prstGeom prst="rect">
             <a:avLst/>
@@ -2133,8 +2133,8 @@
         </p:blipFill>
         <p:spPr>
           <a:xfrm>
-            <a:off x="1330200" y="1326600"/>
-            <a:ext cx="7447320" cy="3827880"/>
+            <a:off x="1348200" y="1097280"/>
+            <a:ext cx="7475400" cy="4236840"/>
           </a:xfrm>
           <a:prstGeom prst="rect">
             <a:avLst/>
@@ -2183,7 +2183,7 @@
         <p:spPr>
           <a:xfrm>
             <a:off x="504000" y="365760"/>
-            <a:ext cx="9070560" cy="730800"/>
+            <a:ext cx="9068760" cy="729000"/>
           </a:xfrm>
           <a:prstGeom prst="rect">
             <a:avLst/>
@@ -2234,7 +2234,7 @@
         <p:spPr>
           <a:xfrm>
             <a:off x="504000" y="1326600"/>
-            <a:ext cx="9071280" cy="3287880"/>
+            <a:ext cx="9069480" cy="3286080"/>
           </a:xfrm>
           <a:prstGeom prst="rect">
             <a:avLst/>
@@ -2263,8 +2263,8 @@
         </p:blipFill>
         <p:spPr>
           <a:xfrm>
-            <a:off x="1645920" y="1326600"/>
-            <a:ext cx="6495120" cy="3475440"/>
+            <a:off x="1486080" y="1280160"/>
+            <a:ext cx="7199280" cy="3836880"/>
           </a:xfrm>
           <a:prstGeom prst="rect">
             <a:avLst/>
@@ -2313,7 +2313,7 @@
         <p:spPr>
           <a:xfrm>
             <a:off x="504000" y="226080"/>
-            <a:ext cx="9070560" cy="945360"/>
+            <a:ext cx="9068760" cy="943560"/>
           </a:xfrm>
           <a:prstGeom prst="rect">
             <a:avLst/>
@@ -2339,7 +2339,7 @@
         <p:spPr>
           <a:xfrm>
             <a:off x="504000" y="1326600"/>
-            <a:ext cx="9071280" cy="3287880"/>
+            <a:ext cx="9069480" cy="3286080"/>
           </a:xfrm>
           <a:prstGeom prst="rect">
             <a:avLst/>

</xml_diff>